<commit_message>
Fixes for Lecture 5.
</commit_message>
<xml_diff>
--- a/05-cryptography2.pptx
+++ b/05-cryptography2.pptx
@@ -165,7 +165,7 @@
   </p:defaultTextStyle>
   <p:extLst>
     <p:ext uri="{EFAFB233-063F-42B5-8137-9DF3F51BA10A}">
-      <p15:sldGuideLst xmlns:p15="http://schemas.microsoft.com/office/powerpoint/2012/main" xmlns="">
+      <p15:sldGuideLst xmlns="" xmlns:p15="http://schemas.microsoft.com/office/powerpoint/2012/main">
         <p15:guide id="1" orient="horz" pos="2160">
           <p15:clr>
             <a:srgbClr val="A4A3A4"/>
@@ -264,7 +264,7 @@
           <a:p>
             <a:fld id="{A944B241-9ED2-8346-A6FC-7C573C4D8827}" type="datetimeFigureOut">
               <a:rPr lang="en-US" smtClean="0"/>
-              <a:t>4/3/15</a:t>
+              <a:t>5/3/15</a:t>
             </a:fld>
             <a:endParaRPr lang="en-US"/>
           </a:p>
@@ -430,7 +430,7 @@
           <a:p>
             <a:fld id="{4AD6CE95-EF84-4C40-B522-FCC6C3A04E14}" type="datetimeFigureOut">
               <a:rPr lang="en-US" smtClean="0"/>
-              <a:t>4/3/15</a:t>
+              <a:t>5/3/15</a:t>
             </a:fld>
             <a:endParaRPr lang="en-US"/>
           </a:p>
@@ -778,8 +778,8 @@
         </p:nvSpPr>
         <p:spPr>
           <a:xfrm>
-            <a:off x="1143000" y="685800"/>
-            <a:ext cx="4573588" cy="3429000"/>
+            <a:off x="1144588" y="685800"/>
+            <a:ext cx="4570412" cy="3429000"/>
           </a:xfrm>
           <a:ln/>
           <a:extLst>
@@ -16717,19 +16717,7 @@
             <a:pPr lvl="1"/>
             <a:r>
               <a:rPr lang="en-US" dirty="0" smtClean="0"/>
-              <a:t>Today at least </a:t>
-            </a:r>
-            <a:r>
-              <a:rPr lang="en-US" dirty="0" smtClean="0"/>
-              <a:t>2048</a:t>
-            </a:r>
-            <a:r>
-              <a:rPr lang="en-US" dirty="0" smtClean="0"/>
-              <a:t> </a:t>
-            </a:r>
-            <a:r>
-              <a:rPr lang="en-US" dirty="0" smtClean="0"/>
-              <a:t>bits to ensure security (4096 bits is better)</a:t>
+              <a:t>Today at least 2048 bits to ensure security (4096 bits is better)</a:t>
             </a:r>
             <a:endParaRPr lang="en-US" dirty="0"/>
           </a:p>
@@ -17263,10 +17251,6 @@
               </a:rPr>
               <a:t>) = 1</a:t>
             </a:r>
-            <a:endParaRPr lang="en-US" dirty="0" smtClean="0">
-              <a:latin typeface="Cambria Math"/>
-              <a:cs typeface="Cambria Math"/>
-            </a:endParaRPr>
           </a:p>
           <a:p>
             <a:pPr marL="0" indent="0">
@@ -17352,11 +17336,7 @@
             </a:r>
             <a:r>
               <a:rPr lang="en-US" dirty="0" smtClean="0"/>
-              <a:t>relatively </a:t>
-            </a:r>
-            <a:r>
-              <a:rPr lang="en-US" dirty="0" smtClean="0"/>
-              <a:t>prime </a:t>
+              <a:t>relatively prime </a:t>
             </a:r>
             <a:r>
               <a:rPr lang="en-US" dirty="0"/>
@@ -17590,11 +17570,7 @@
             </a:r>
             <a:r>
               <a:rPr lang="en-US" dirty="0" smtClean="0"/>
-              <a:t> </a:t>
-            </a:r>
-            <a:r>
-              <a:rPr lang="en-US" dirty="0" smtClean="0"/>
-              <a:t>with </a:t>
+              <a:t> with </a:t>
             </a:r>
             <a:r>
               <a:rPr lang="en-US" i="1" dirty="0">
@@ -17637,15 +17613,7 @@
             </a:r>
             <a:r>
               <a:rPr lang="en-US" dirty="0" smtClean="0"/>
-              <a:t> </a:t>
-            </a:r>
-            <a:r>
-              <a:rPr lang="en-US" dirty="0" smtClean="0"/>
-              <a:t>relatively </a:t>
-            </a:r>
-            <a:r>
-              <a:rPr lang="en-US" dirty="0" smtClean="0"/>
-              <a:t>prime</a:t>
+              <a:t> relatively prime</a:t>
             </a:r>
             <a:endParaRPr lang="en-US" dirty="0"/>
           </a:p>
@@ -18325,7 +18293,6 @@
               <a:rPr lang="en-US" dirty="0" smtClean="0"/>
               <a:t>secret or even thrown away altogether!</a:t>
             </a:r>
-            <a:endParaRPr lang="en-US" dirty="0" smtClean="0"/>
           </a:p>
           <a:p>
             <a:pPr lvl="1">
@@ -19138,7 +19105,14 @@
                 <a:latin typeface="Cambria Math"/>
                 <a:cs typeface="Cambria Math"/>
               </a:rPr>
-              <a:t>		, </a:t>
+              <a:t>	</a:t>
+            </a:r>
+            <a:r>
+              <a:rPr lang="en-US" dirty="0" smtClean="0">
+                <a:latin typeface="Cambria Math"/>
+                <a:cs typeface="Cambria Math"/>
+              </a:rPr>
+              <a:t>, </a:t>
             </a:r>
             <a:r>
               <a:rPr lang="en-US" dirty="0">
@@ -20641,8 +20615,9 @@
             </a:r>
             <a:r>
               <a:rPr lang="en-US" dirty="0" smtClean="0"/>
-              <a:t>CBC?</a:t>
-            </a:r>
+              <a:t>Cipher Block Chaining (CBC)?</a:t>
+            </a:r>
+            <a:endParaRPr lang="en-US" dirty="0" smtClean="0"/>
           </a:p>
           <a:p>
             <a:pPr lvl="1"/>
@@ -27815,7 +27790,7 @@
           <a:graphicData uri="http://schemas.openxmlformats.org/presentationml/2006/ole">
             <mc:AlternateContent xmlns:mc="http://schemas.openxmlformats.org/markup-compatibility/2006">
               <mc:Choice xmlns:v="urn:schemas-microsoft-com:vml" Requires="v">
-                <p:oleObj spid="_x0000_s94276" name="Equation" r:id="rId4" imgW="1155700" imgH="355600" progId="Equation.3">
+                <p:oleObj spid="_x0000_s94282" name="Equation" r:id="rId4" imgW="1155700" imgH="355600" progId="Equation.3">
                   <p:embed/>
                 </p:oleObj>
               </mc:Choice>
@@ -28436,7 +28411,7 @@
           <a:graphicData uri="http://schemas.openxmlformats.org/presentationml/2006/ole">
             <mc:AlternateContent xmlns:mc="http://schemas.openxmlformats.org/markup-compatibility/2006">
               <mc:Choice xmlns:v="urn:schemas-microsoft-com:vml" Requires="v">
-                <p:oleObj spid="_x0000_s32900" name="Equation" r:id="rId4" imgW="1917700" imgH="419100" progId="Equation.3">
+                <p:oleObj spid="_x0000_s32911" name="Equation" r:id="rId4" imgW="1917700" imgH="419100" progId="Equation.3">
                   <p:embed/>
                 </p:oleObj>
               </mc:Choice>
@@ -28493,7 +28468,7 @@
           <a:graphicData uri="http://schemas.openxmlformats.org/presentationml/2006/ole">
             <mc:AlternateContent xmlns:mc="http://schemas.openxmlformats.org/markup-compatibility/2006">
               <mc:Choice xmlns:v="urn:schemas-microsoft-com:vml" Requires="v">
-                <p:oleObj spid="_x0000_s32901" name="Equation" r:id="rId6" imgW="1066800" imgH="431800" progId="Equation.3">
+                <p:oleObj spid="_x0000_s32912" name="Equation" r:id="rId6" imgW="1066800" imgH="431800" progId="Equation.3">
                   <p:embed/>
                 </p:oleObj>
               </mc:Choice>
@@ -29632,7 +29607,7 @@
           <a:graphicData uri="http://schemas.openxmlformats.org/presentationml/2006/ole">
             <mc:AlternateContent xmlns:mc="http://schemas.openxmlformats.org/markup-compatibility/2006">
               <mc:Choice xmlns:v="urn:schemas-microsoft-com:vml" Requires="v">
-                <p:oleObj spid="_x0000_s100420" name="Equation" r:id="rId4" imgW="2413000" imgH="533400" progId="Equation.3">
+                <p:oleObj spid="_x0000_s100426" name="Equation" r:id="rId4" imgW="2413000" imgH="533400" progId="Equation.3">
                   <p:embed/>
                 </p:oleObj>
               </mc:Choice>
@@ -33890,27 +33865,7 @@
                 <a:latin typeface="Tahoma"/>
                 <a:cs typeface="Tahoma"/>
               </a:rPr>
-              <a:t>m</a:t>
-            </a:r>
-            <a:r>
-              <a:rPr lang="en-US" dirty="0">
-                <a:solidFill>
-                  <a:schemeClr val="lt1"/>
-                </a:solidFill>
-                <a:latin typeface="Tahoma"/>
-                <a:cs typeface="Tahoma"/>
-              </a:rPr>
-              <a:t>essage  </a:t>
-            </a:r>
-            <a:r>
-              <a:rPr lang="en-US" dirty="0">
-                <a:solidFill>
-                  <a:schemeClr val="lt1"/>
-                </a:solidFill>
-                <a:latin typeface="Tahoma"/>
-                <a:cs typeface="Tahoma"/>
-              </a:rPr>
-              <a:t>m </a:t>
+              <a:t>message  m </a:t>
             </a:r>
           </a:p>
         </p:txBody>

</xml_diff>